<commit_message>
Change Navigation bar style, logo and Add contact, selfstudy.html template
</commit_message>
<xml_diff>
--- a/logo.pptx
+++ b/logo.pptx
@@ -9,6 +9,7 @@
     <p:sldId id="257" r:id="rId3"/>
     <p:sldId id="258" r:id="rId4"/>
     <p:sldId id="259" r:id="rId5"/>
+    <p:sldId id="260" r:id="rId6"/>
   </p:sldIdLst>
   <p:sldSz cx="12192000" cy="6858000"/>
   <p:notesSz cx="6858000" cy="9144000"/>
@@ -257,7 +258,7 @@
           <a:p>
             <a:fld id="{2B00307A-1F28-9E43-B007-5EE80B849A80}" type="datetimeFigureOut">
               <a:rPr kumimoji="1" lang="ko-KR" altLang="en-US" smtClean="0"/>
-              <a:t>2016. 9. 14.</a:t>
+              <a:t>2016-11-29</a:t>
             </a:fld>
             <a:endParaRPr kumimoji="1" lang="ko-KR" altLang="en-US"/>
           </a:p>
@@ -427,7 +428,7 @@
           <a:p>
             <a:fld id="{2B00307A-1F28-9E43-B007-5EE80B849A80}" type="datetimeFigureOut">
               <a:rPr kumimoji="1" lang="ko-KR" altLang="en-US" smtClean="0"/>
-              <a:t>2016. 9. 14.</a:t>
+              <a:t>2016-11-29</a:t>
             </a:fld>
             <a:endParaRPr kumimoji="1" lang="ko-KR" altLang="en-US"/>
           </a:p>
@@ -607,7 +608,7 @@
           <a:p>
             <a:fld id="{2B00307A-1F28-9E43-B007-5EE80B849A80}" type="datetimeFigureOut">
               <a:rPr kumimoji="1" lang="ko-KR" altLang="en-US" smtClean="0"/>
-              <a:t>2016. 9. 14.</a:t>
+              <a:t>2016-11-29</a:t>
             </a:fld>
             <a:endParaRPr kumimoji="1" lang="ko-KR" altLang="en-US"/>
           </a:p>
@@ -777,7 +778,7 @@
           <a:p>
             <a:fld id="{2B00307A-1F28-9E43-B007-5EE80B849A80}" type="datetimeFigureOut">
               <a:rPr kumimoji="1" lang="ko-KR" altLang="en-US" smtClean="0"/>
-              <a:t>2016. 9. 14.</a:t>
+              <a:t>2016-11-29</a:t>
             </a:fld>
             <a:endParaRPr kumimoji="1" lang="ko-KR" altLang="en-US"/>
           </a:p>
@@ -1023,7 +1024,7 @@
           <a:p>
             <a:fld id="{2B00307A-1F28-9E43-B007-5EE80B849A80}" type="datetimeFigureOut">
               <a:rPr kumimoji="1" lang="ko-KR" altLang="en-US" smtClean="0"/>
-              <a:t>2016. 9. 14.</a:t>
+              <a:t>2016-11-29</a:t>
             </a:fld>
             <a:endParaRPr kumimoji="1" lang="ko-KR" altLang="en-US"/>
           </a:p>
@@ -1255,7 +1256,7 @@
           <a:p>
             <a:fld id="{2B00307A-1F28-9E43-B007-5EE80B849A80}" type="datetimeFigureOut">
               <a:rPr kumimoji="1" lang="ko-KR" altLang="en-US" smtClean="0"/>
-              <a:t>2016. 9. 14.</a:t>
+              <a:t>2016-11-29</a:t>
             </a:fld>
             <a:endParaRPr kumimoji="1" lang="ko-KR" altLang="en-US"/>
           </a:p>
@@ -1622,7 +1623,7 @@
           <a:p>
             <a:fld id="{2B00307A-1F28-9E43-B007-5EE80B849A80}" type="datetimeFigureOut">
               <a:rPr kumimoji="1" lang="ko-KR" altLang="en-US" smtClean="0"/>
-              <a:t>2016. 9. 14.</a:t>
+              <a:t>2016-11-29</a:t>
             </a:fld>
             <a:endParaRPr kumimoji="1" lang="ko-KR" altLang="en-US"/>
           </a:p>
@@ -1740,7 +1741,7 @@
           <a:p>
             <a:fld id="{2B00307A-1F28-9E43-B007-5EE80B849A80}" type="datetimeFigureOut">
               <a:rPr kumimoji="1" lang="ko-KR" altLang="en-US" smtClean="0"/>
-              <a:t>2016. 9. 14.</a:t>
+              <a:t>2016-11-29</a:t>
             </a:fld>
             <a:endParaRPr kumimoji="1" lang="ko-KR" altLang="en-US"/>
           </a:p>
@@ -1835,7 +1836,7 @@
           <a:p>
             <a:fld id="{2B00307A-1F28-9E43-B007-5EE80B849A80}" type="datetimeFigureOut">
               <a:rPr kumimoji="1" lang="ko-KR" altLang="en-US" smtClean="0"/>
-              <a:t>2016. 9. 14.</a:t>
+              <a:t>2016-11-29</a:t>
             </a:fld>
             <a:endParaRPr kumimoji="1" lang="ko-KR" altLang="en-US"/>
           </a:p>
@@ -2112,7 +2113,7 @@
           <a:p>
             <a:fld id="{2B00307A-1F28-9E43-B007-5EE80B849A80}" type="datetimeFigureOut">
               <a:rPr kumimoji="1" lang="ko-KR" altLang="en-US" smtClean="0"/>
-              <a:t>2016. 9. 14.</a:t>
+              <a:t>2016-11-29</a:t>
             </a:fld>
             <a:endParaRPr kumimoji="1" lang="ko-KR" altLang="en-US"/>
           </a:p>
@@ -2365,7 +2366,7 @@
           <a:p>
             <a:fld id="{2B00307A-1F28-9E43-B007-5EE80B849A80}" type="datetimeFigureOut">
               <a:rPr kumimoji="1" lang="ko-KR" altLang="en-US" smtClean="0"/>
-              <a:t>2016. 9. 14.</a:t>
+              <a:t>2016-11-29</a:t>
             </a:fld>
             <a:endParaRPr kumimoji="1" lang="ko-KR" altLang="en-US"/>
           </a:p>
@@ -2578,7 +2579,7 @@
           <a:p>
             <a:fld id="{2B00307A-1F28-9E43-B007-5EE80B849A80}" type="datetimeFigureOut">
               <a:rPr kumimoji="1" lang="ko-KR" altLang="en-US" smtClean="0"/>
-              <a:t>2016. 9. 14.</a:t>
+              <a:t>2016-11-29</a:t>
             </a:fld>
             <a:endParaRPr kumimoji="1" lang="ko-KR" altLang="en-US"/>
           </a:p>
@@ -4009,10 +4010,347 @@
           <a:chExt cx="0" cy="0"/>
         </a:xfrm>
       </p:grpSpPr>
+      <p:grpSp>
+        <p:nvGrpSpPr>
+          <p:cNvPr id="9" name="그룹 8"/>
+          <p:cNvGrpSpPr/>
+          <p:nvPr/>
+        </p:nvGrpSpPr>
+        <p:grpSpPr>
+          <a:xfrm>
+            <a:off x="4901940" y="2570600"/>
+            <a:ext cx="2422688" cy="1605545"/>
+            <a:chOff x="4901940" y="2570600"/>
+            <a:chExt cx="2422688" cy="1605545"/>
+          </a:xfrm>
+        </p:grpSpPr>
+        <p:sp>
+          <p:nvSpPr>
+            <p:cNvPr id="4" name="TextBox 3"/>
+            <p:cNvSpPr txBox="1"/>
+            <p:nvPr/>
+          </p:nvSpPr>
+          <p:spPr>
+            <a:xfrm>
+              <a:off x="4998198" y="3036880"/>
+              <a:ext cx="1796068" cy="770980"/>
+            </a:xfrm>
+            <a:prstGeom prst="rect">
+              <a:avLst/>
+            </a:prstGeom>
+            <a:noFill/>
+          </p:spPr>
+          <p:txBody>
+            <a:bodyPr wrap="square" rtlCol="0">
+              <a:spAutoFit/>
+            </a:bodyPr>
+            <a:lstStyle/>
+            <a:p>
+              <a:pPr>
+                <a:lnSpc>
+                  <a:spcPct val="80000"/>
+                </a:lnSpc>
+              </a:pPr>
+              <a:r>
+                <a:rPr kumimoji="1" lang="en-US" altLang="ko-KR" b="1" spc="600" dirty="0" smtClean="0">
+                  <a:latin typeface="Apple SD Gothic Neo" charset="-127"/>
+                  <a:ea typeface="Apple SD Gothic Neo" charset="-127"/>
+                  <a:cs typeface="Apple SD Gothic Neo" charset="-127"/>
+                </a:rPr>
+                <a:t>YOUNG</a:t>
+              </a:r>
+            </a:p>
+            <a:p>
+              <a:pPr>
+                <a:lnSpc>
+                  <a:spcPct val="80000"/>
+                </a:lnSpc>
+              </a:pPr>
+              <a:r>
+                <a:rPr kumimoji="1" lang="en-US" altLang="ko-KR" b="1" spc="600" dirty="0" smtClean="0">
+                  <a:latin typeface="Apple SD Gothic Neo" charset="-127"/>
+                  <a:ea typeface="Apple SD Gothic Neo" charset="-127"/>
+                  <a:cs typeface="Apple SD Gothic Neo" charset="-127"/>
+                </a:rPr>
+                <a:t>HUN</a:t>
+              </a:r>
+            </a:p>
+            <a:p>
+              <a:pPr>
+                <a:lnSpc>
+                  <a:spcPct val="80000"/>
+                </a:lnSpc>
+              </a:pPr>
+              <a:r>
+                <a:rPr kumimoji="1" lang="en-US" altLang="ko-KR" b="1" spc="600" dirty="0" smtClean="0">
+                  <a:latin typeface="Apple SD Gothic Neo" charset="-127"/>
+                  <a:ea typeface="Apple SD Gothic Neo" charset="-127"/>
+                  <a:cs typeface="Apple SD Gothic Neo" charset="-127"/>
+                </a:rPr>
+                <a:t>JUNG</a:t>
+              </a:r>
+            </a:p>
+          </p:txBody>
+        </p:sp>
+        <p:sp>
+          <p:nvSpPr>
+            <p:cNvPr id="5" name="TextBox 4"/>
+            <p:cNvSpPr txBox="1"/>
+            <p:nvPr/>
+          </p:nvSpPr>
+          <p:spPr>
+            <a:xfrm>
+              <a:off x="5723467" y="3054301"/>
+              <a:ext cx="1568732" cy="770980"/>
+            </a:xfrm>
+            <a:prstGeom prst="rect">
+              <a:avLst/>
+            </a:prstGeom>
+            <a:noFill/>
+          </p:spPr>
+          <p:txBody>
+            <a:bodyPr wrap="square" rtlCol="0">
+              <a:spAutoFit/>
+            </a:bodyPr>
+            <a:lstStyle/>
+            <a:p>
+              <a:pPr algn="r">
+                <a:lnSpc>
+                  <a:spcPct val="80000"/>
+                </a:lnSpc>
+              </a:pPr>
+              <a:r>
+                <a:rPr kumimoji="1" lang="en-US" altLang="ko-KR" b="1" spc="600" dirty="0" smtClean="0">
+                  <a:solidFill>
+                    <a:srgbClr val="FF4600"/>
+                  </a:solidFill>
+                  <a:latin typeface="Apple SD Gothic Neo" charset="-127"/>
+                  <a:ea typeface="Apple SD Gothic Neo" charset="-127"/>
+                  <a:cs typeface="Apple SD Gothic Neo" charset="-127"/>
+                </a:rPr>
+                <a:t>JUNG</a:t>
+              </a:r>
+            </a:p>
+            <a:p>
+              <a:pPr algn="r">
+                <a:lnSpc>
+                  <a:spcPct val="80000"/>
+                </a:lnSpc>
+              </a:pPr>
+              <a:r>
+                <a:rPr kumimoji="1" lang="en-US" altLang="ko-KR" b="1" spc="600" dirty="0" smtClean="0">
+                  <a:solidFill>
+                    <a:srgbClr val="FF4600"/>
+                  </a:solidFill>
+                  <a:latin typeface="Apple SD Gothic Neo" charset="-127"/>
+                  <a:ea typeface="Apple SD Gothic Neo" charset="-127"/>
+                  <a:cs typeface="Apple SD Gothic Neo" charset="-127"/>
+                </a:rPr>
+                <a:t>YOUNG</a:t>
+              </a:r>
+            </a:p>
+            <a:p>
+              <a:pPr algn="r">
+                <a:lnSpc>
+                  <a:spcPct val="80000"/>
+                </a:lnSpc>
+              </a:pPr>
+              <a:r>
+                <a:rPr kumimoji="1" lang="en-US" altLang="ko-KR" b="1" spc="600" dirty="0" smtClean="0">
+                  <a:solidFill>
+                    <a:srgbClr val="FF4600"/>
+                  </a:solidFill>
+                  <a:latin typeface="Apple SD Gothic Neo" charset="-127"/>
+                  <a:ea typeface="Apple SD Gothic Neo" charset="-127"/>
+                  <a:cs typeface="Apple SD Gothic Neo" charset="-127"/>
+                </a:rPr>
+                <a:t>HUN</a:t>
+              </a:r>
+            </a:p>
+          </p:txBody>
+        </p:sp>
+        <p:sp>
+          <p:nvSpPr>
+            <p:cNvPr id="6" name="TextBox 5"/>
+            <p:cNvSpPr txBox="1"/>
+            <p:nvPr/>
+          </p:nvSpPr>
+          <p:spPr>
+            <a:xfrm>
+              <a:off x="4901940" y="2570600"/>
+              <a:ext cx="2422688" cy="230832"/>
+            </a:xfrm>
+            <a:prstGeom prst="rect">
+              <a:avLst/>
+            </a:prstGeom>
+            <a:noFill/>
+          </p:spPr>
+          <p:txBody>
+            <a:bodyPr wrap="square" rtlCol="0">
+              <a:spAutoFit/>
+            </a:bodyPr>
+            <a:lstStyle/>
+            <a:p>
+              <a:r>
+                <a:rPr kumimoji="1" lang="en-US" altLang="ko-KR" sz="900" dirty="0" smtClean="0">
+                  <a:solidFill>
+                    <a:srgbClr val="FF3B3B"/>
+                  </a:solidFill>
+                </a:rPr>
+                <a:t>l l l l </a:t>
+              </a:r>
+              <a:r>
+                <a:rPr kumimoji="1" lang="en-US" altLang="ko-KR" sz="900" dirty="0" smtClean="0">
+                  <a:solidFill>
+                    <a:srgbClr val="B40000"/>
+                  </a:solidFill>
+                </a:rPr>
+                <a:t>l l l l l </a:t>
+              </a:r>
+              <a:r>
+                <a:rPr kumimoji="1" lang="en-US" altLang="ko-KR" sz="900" dirty="0" smtClean="0">
+                  <a:solidFill>
+                    <a:srgbClr val="971103"/>
+                  </a:solidFill>
+                </a:rPr>
+                <a:t>l l l l l l l</a:t>
+              </a:r>
+              <a:r>
+                <a:rPr kumimoji="1" lang="en-US" altLang="ko-KR" sz="900" dirty="0" smtClean="0">
+                  <a:solidFill>
+                    <a:srgbClr val="9E0000"/>
+                  </a:solidFill>
+                </a:rPr>
+                <a:t> </a:t>
+              </a:r>
+              <a:r>
+                <a:rPr kumimoji="1" lang="en-US" altLang="ko-KR" sz="900" dirty="0" smtClean="0">
+                  <a:solidFill>
+                    <a:srgbClr val="640000"/>
+                  </a:solidFill>
+                </a:rPr>
+                <a:t>l l l l l l l l l l </a:t>
+              </a:r>
+              <a:r>
+                <a:rPr kumimoji="1" lang="en-US" altLang="ko-KR" sz="900" dirty="0" smtClean="0"/>
+                <a:t>l l l l l l l </a:t>
+              </a:r>
+              <a:endParaRPr kumimoji="1" lang="ko-KR" altLang="en-US" sz="900" dirty="0" smtClean="0"/>
+            </a:p>
+          </p:txBody>
+        </p:sp>
+        <p:sp>
+          <p:nvSpPr>
+            <p:cNvPr id="8" name="TextBox 7"/>
+            <p:cNvSpPr txBox="1"/>
+            <p:nvPr/>
+          </p:nvSpPr>
+          <p:spPr>
+            <a:xfrm rot="10800000">
+              <a:off x="4901940" y="3945313"/>
+              <a:ext cx="2422688" cy="230832"/>
+            </a:xfrm>
+            <a:prstGeom prst="rect">
+              <a:avLst/>
+            </a:prstGeom>
+            <a:noFill/>
+          </p:spPr>
+          <p:txBody>
+            <a:bodyPr wrap="square" rtlCol="0">
+              <a:spAutoFit/>
+            </a:bodyPr>
+            <a:lstStyle/>
+            <a:p>
+              <a:r>
+                <a:rPr kumimoji="1" lang="en-US" altLang="ko-KR" sz="900" dirty="0" smtClean="0">
+                  <a:solidFill>
+                    <a:srgbClr val="FF3B3B"/>
+                  </a:solidFill>
+                </a:rPr>
+                <a:t>l l l l </a:t>
+              </a:r>
+              <a:r>
+                <a:rPr kumimoji="1" lang="en-US" altLang="ko-KR" sz="900" dirty="0" smtClean="0">
+                  <a:solidFill>
+                    <a:srgbClr val="B40000"/>
+                  </a:solidFill>
+                </a:rPr>
+                <a:t>l l l l l </a:t>
+              </a:r>
+              <a:r>
+                <a:rPr kumimoji="1" lang="en-US" altLang="ko-KR" sz="900" dirty="0" smtClean="0">
+                  <a:solidFill>
+                    <a:srgbClr val="971103"/>
+                  </a:solidFill>
+                </a:rPr>
+                <a:t>l l l l l l l</a:t>
+              </a:r>
+              <a:r>
+                <a:rPr kumimoji="1" lang="en-US" altLang="ko-KR" sz="900" dirty="0" smtClean="0">
+                  <a:solidFill>
+                    <a:srgbClr val="9E0000"/>
+                  </a:solidFill>
+                </a:rPr>
+                <a:t> </a:t>
+              </a:r>
+              <a:r>
+                <a:rPr kumimoji="1" lang="en-US" altLang="ko-KR" sz="900" dirty="0" smtClean="0">
+                  <a:solidFill>
+                    <a:srgbClr val="640000"/>
+                  </a:solidFill>
+                </a:rPr>
+                <a:t>l l l l l l l l l l </a:t>
+              </a:r>
+              <a:r>
+                <a:rPr kumimoji="1" lang="en-US" altLang="ko-KR" sz="900" dirty="0" smtClean="0"/>
+                <a:t>l l l l l l l </a:t>
+              </a:r>
+              <a:endParaRPr kumimoji="1" lang="ko-KR" altLang="en-US" sz="900" dirty="0" smtClean="0"/>
+            </a:p>
+          </p:txBody>
+        </p:sp>
+      </p:grpSp>
     </p:spTree>
     <p:extLst>
       <p:ext uri="{BB962C8B-B14F-4D97-AF65-F5344CB8AC3E}">
         <p14:creationId xmlns:p14="http://schemas.microsoft.com/office/powerpoint/2010/main" val="1201606301"/>
+      </p:ext>
+    </p:extLst>
+  </p:cSld>
+  <p:clrMapOvr>
+    <a:masterClrMapping/>
+  </p:clrMapOvr>
+  <p:timing>
+    <p:tnLst>
+      <p:par>
+        <p:cTn id="1" dur="indefinite" restart="never" nodeType="tmRoot"/>
+      </p:par>
+    </p:tnLst>
+  </p:timing>
+</p:sld>
+</file>
+
+<file path=ppt/slides/slide5.xml><?xml version="1.0" encoding="utf-8"?>
+<p:sld xmlns:a="http://schemas.openxmlformats.org/drawingml/2006/main" xmlns:r="http://schemas.openxmlformats.org/officeDocument/2006/relationships" xmlns:p="http://schemas.openxmlformats.org/presentationml/2006/main">
+  <p:cSld>
+    <p:spTree>
+      <p:nvGrpSpPr>
+        <p:cNvPr id="1" name=""/>
+        <p:cNvGrpSpPr/>
+        <p:nvPr/>
+      </p:nvGrpSpPr>
+      <p:grpSpPr>
+        <a:xfrm>
+          <a:off x="0" y="0"/>
+          <a:ext cx="0" cy="0"/>
+          <a:chOff x="0" y="0"/>
+          <a:chExt cx="0" cy="0"/>
+        </a:xfrm>
+      </p:grpSpPr>
+    </p:spTree>
+    <p:extLst>
+      <p:ext uri="{BB962C8B-B14F-4D97-AF65-F5344CB8AC3E}">
+        <p14:creationId xmlns:p14="http://schemas.microsoft.com/office/powerpoint/2010/main" val="1439972894"/>
       </p:ext>
     </p:extLst>
   </p:cSld>

</xml_diff>